<commit_message>
esquema de dinámica molecular modificado
</commit_message>
<xml_diff>
--- a/src/figs/metodos/esquema_de_dinamica_molecular.pptx
+++ b/src/figs/metodos/esquema_de_dinamica_molecular.pptx
@@ -5582,14 +5582,14 @@
             <a:avLst/>
           </a:prstGeom>
           <a:noFill/>
-          <a:ln cap="flat" cmpd="sng" w="9525">
+          <a:ln cap="flat" cmpd="sng" w="19050">
             <a:solidFill>
               <a:schemeClr val="dk2"/>
             </a:solidFill>
             <a:prstDash val="solid"/>
             <a:round/>
             <a:headEnd len="med" w="med" type="none"/>
-            <a:tailEnd len="med" w="med" type="stealth"/>
+            <a:tailEnd len="med" w="med" type="triangle"/>
           </a:ln>
         </p:spPr>
       </p:cxnSp>
@@ -5608,14 +5608,14 @@
             <a:avLst/>
           </a:prstGeom>
           <a:noFill/>
-          <a:ln cap="flat" cmpd="sng" w="9525">
+          <a:ln cap="flat" cmpd="sng" w="19050">
             <a:solidFill>
               <a:schemeClr val="dk2"/>
             </a:solidFill>
             <a:prstDash val="solid"/>
             <a:round/>
             <a:headEnd len="med" w="med" type="none"/>
-            <a:tailEnd len="med" w="med" type="stealth"/>
+            <a:tailEnd len="med" w="med" type="triangle"/>
           </a:ln>
         </p:spPr>
       </p:cxnSp>
@@ -5692,14 +5692,14 @@
             <a:avLst/>
           </a:prstGeom>
           <a:noFill/>
-          <a:ln cap="flat" cmpd="sng" w="9525">
+          <a:ln cap="flat" cmpd="sng" w="19050">
             <a:solidFill>
               <a:schemeClr val="dk2"/>
             </a:solidFill>
             <a:prstDash val="solid"/>
             <a:round/>
             <a:headEnd len="med" w="med" type="none"/>
-            <a:tailEnd len="med" w="med" type="stealth"/>
+            <a:tailEnd len="med" w="med" type="triangle"/>
           </a:ln>
         </p:spPr>
       </p:cxnSp>
@@ -5712,7 +5712,7 @@
         <p:spPr>
           <a:xfrm>
             <a:off x="4743325" y="2897138"/>
-            <a:ext cx="1912200" cy="1693200"/>
+            <a:ext cx="1912200" cy="831300"/>
           </a:xfrm>
           <a:prstGeom prst="rect">
             <a:avLst/>
@@ -5750,7 +5750,7 @@
                 <a:cs typeface="Palatino"/>
                 <a:sym typeface="Palatino"/>
               </a:rPr>
-              <a:t>Cómputo de propiedades termodinámicas de interés y escritura de las mismas y las posiciones archivos de salida</a:t>
+              <a:t>Cómputo de propiedades termodinámicas</a:t>
             </a:r>
             <a:endParaRPr>
               <a:latin typeface="Palatino"/>
@@ -5776,14 +5776,14 @@
             <a:avLst/>
           </a:prstGeom>
           <a:noFill/>
-          <a:ln cap="flat" cmpd="sng" w="9525">
+          <a:ln cap="flat" cmpd="sng" w="19050">
             <a:solidFill>
               <a:schemeClr val="dk2"/>
             </a:solidFill>
             <a:prstDash val="solid"/>
             <a:round/>
             <a:headEnd len="med" w="med" type="none"/>
-            <a:tailEnd len="med" w="med" type="stealth"/>
+            <a:tailEnd len="med" w="med" type="triangle"/>
           </a:ln>
         </p:spPr>
       </p:cxnSp>
@@ -5886,14 +5886,14 @@
             <a:avLst/>
           </a:prstGeom>
           <a:noFill/>
-          <a:ln cap="flat" cmpd="sng" w="9525">
+          <a:ln cap="flat" cmpd="sng" w="19050">
             <a:solidFill>
               <a:schemeClr val="dk2"/>
             </a:solidFill>
             <a:prstDash val="solid"/>
             <a:round/>
             <a:headEnd len="med" w="med" type="none"/>
-            <a:tailEnd len="med" w="med" type="stealth"/>
+            <a:tailEnd len="med" w="med" type="triangle"/>
           </a:ln>
         </p:spPr>
       </p:cxnSp>
@@ -5972,14 +5972,14 @@
             <a:avLst/>
           </a:prstGeom>
           <a:noFill/>
-          <a:ln cap="flat" cmpd="sng" w="9525">
+          <a:ln cap="flat" cmpd="sng" w="19050">
             <a:solidFill>
               <a:schemeClr val="dk2"/>
             </a:solidFill>
             <a:prstDash val="solid"/>
             <a:round/>
             <a:headEnd len="med" w="med" type="none"/>
-            <a:tailEnd len="med" w="med" type="stealth"/>
+            <a:tailEnd len="med" w="med" type="triangle"/>
           </a:ln>
         </p:spPr>
       </p:cxnSp>
@@ -6108,14 +6108,14 @@
             <a:avLst/>
           </a:prstGeom>
           <a:noFill/>
-          <a:ln cap="flat" cmpd="sng" w="9525">
+          <a:ln cap="flat" cmpd="sng" w="19050">
             <a:solidFill>
               <a:schemeClr val="dk2"/>
             </a:solidFill>
             <a:prstDash val="solid"/>
             <a:round/>
             <a:headEnd len="med" w="med" type="none"/>
-            <a:tailEnd len="med" w="med" type="stealth"/>
+            <a:tailEnd len="med" w="med" type="triangle"/>
           </a:ln>
         </p:spPr>
       </p:cxnSp>
@@ -6127,7 +6127,7 @@
         </p:nvSpPr>
         <p:spPr>
           <a:xfrm>
-            <a:off x="5697475" y="1101500"/>
+            <a:off x="5805900" y="1101500"/>
             <a:ext cx="578100" cy="369300"/>
           </a:xfrm>
           <a:prstGeom prst="rect">

</xml_diff>